<commit_message>
Presentation slides updated with git repo URL
</commit_message>
<xml_diff>
--- a/analysis/goel-modi-moroney-ramprasad-replication-project-presentation.pptx
+++ b/analysis/goel-modi-moroney-ramprasad-replication-project-presentation.pptx
@@ -784,7 +784,7 @@
         </p:nvSpPr>
         <p:spPr>
           <a:xfrm>
-            <a:off x="381300" y="685800"/>
+            <a:off x="381000" y="685800"/>
             <a:ext cx="6096000" cy="3429000"/>
           </a:xfrm>
           <a:custGeom>
@@ -11682,17 +11682,9 @@
           </a:bodyPr>
           <a:lstStyle/>
           <a:p>
-            <a:pPr marL="0" lvl="0" indent="0" algn="l" rtl="0">
-              <a:spcBef>
-                <a:spcPts val="0"/>
-              </a:spcBef>
-              <a:spcAft>
-                <a:spcPts val="0"/>
-              </a:spcAft>
-              <a:buNone/>
-            </a:pPr>
+            <a:pPr lvl="0"/>
             <a:r>
-              <a:rPr lang="en" sz="900" b="1">
+              <a:rPr lang="en" sz="900" b="1" dirty="0">
                 <a:solidFill>
                   <a:srgbClr val="434343"/>
                 </a:solidFill>
@@ -11704,7 +11696,7 @@
               <a:t>Replication Project GitHub Repository:</a:t>
             </a:r>
             <a:r>
-              <a:rPr lang="en" sz="900" i="1">
+              <a:rPr lang="en" sz="900" i="1" dirty="0">
                 <a:solidFill>
                   <a:schemeClr val="dk2"/>
                 </a:solidFill>
@@ -11715,8 +11707,11 @@
               </a:rPr>
               <a:t> </a:t>
             </a:r>
+          </a:p>
+          <a:p>
+            <a:pPr lvl="0"/>
             <a:r>
-              <a:rPr lang="en" sz="900" u="sng">
+              <a:rPr lang="en-US" sz="900" u="sng" dirty="0">
                 <a:solidFill>
                   <a:srgbClr val="0000FF"/>
                 </a:solidFill>
@@ -11724,11 +11719,10 @@
                 <a:ea typeface="Roboto"/>
                 <a:cs typeface="Roboto"/>
                 <a:sym typeface="Roboto"/>
-                <a:hlinkClick r:id="rId3"/>
               </a:rPr>
-              <a:t>https://github.com/abolim/Reproducibility-Research-Replication</a:t>
+              <a:t>https://github.com/UW-MSDS-DATA-598-Reproducibility-WI20/goel-modi-moroney-ramprasad-replication-project</a:t>
             </a:r>
-            <a:endParaRPr sz="900" i="1">
+            <a:endParaRPr sz="900" i="1" dirty="0">
               <a:solidFill>
                 <a:srgbClr val="0000FF"/>
               </a:solidFill>
@@ -11748,10 +11742,13 @@
               </a:spcAft>
               <a:buNone/>
             </a:pPr>
-            <a:endParaRPr sz="900" i="1">
+            <a:endParaRPr lang="en" sz="400" b="1" dirty="0">
               <a:solidFill>
-                <a:srgbClr val="0000FF"/>
+                <a:srgbClr val="434343"/>
               </a:solidFill>
+              <a:highlight>
+                <a:schemeClr val="lt1"/>
+              </a:highlight>
               <a:latin typeface="Roboto"/>
               <a:ea typeface="Roboto"/>
               <a:cs typeface="Roboto"/>
@@ -11769,7 +11766,7 @@
               <a:buNone/>
             </a:pPr>
             <a:r>
-              <a:rPr lang="en" sz="900" b="1">
+              <a:rPr lang="en" sz="900" b="1" dirty="0">
                 <a:solidFill>
                   <a:srgbClr val="434343"/>
                 </a:solidFill>
@@ -11784,7 +11781,7 @@
               <a:t>Original Paper Citation:</a:t>
             </a:r>
             <a:r>
-              <a:rPr lang="en" sz="900">
+              <a:rPr lang="en" sz="900" dirty="0">
                 <a:solidFill>
                   <a:srgbClr val="434343"/>
                 </a:solidFill>
@@ -11799,7 +11796,7 @@
               <a:t> Lee, Y., Yoon, S., &amp; Jung, K. (2018). Comparative studies of detecting abusive language on twitter. arXiv preprint arXiv:1808.10245. </a:t>
             </a:r>
             <a:r>
-              <a:rPr lang="en" sz="900" b="1">
+              <a:rPr lang="en" sz="900" b="1" dirty="0">
                 <a:solidFill>
                   <a:srgbClr val="24292E"/>
                 </a:solidFill>
@@ -11814,7 +11811,7 @@
               <a:t>URL</a:t>
             </a:r>
             <a:r>
-              <a:rPr lang="en" sz="900">
+              <a:rPr lang="en" sz="900" dirty="0">
                 <a:solidFill>
                   <a:srgbClr val="24292E"/>
                 </a:solidFill>
@@ -11829,7 +11826,7 @@
               <a:t>: </a:t>
             </a:r>
             <a:r>
-              <a:rPr lang="en" sz="900">
+              <a:rPr lang="en" sz="900" dirty="0">
                 <a:solidFill>
                   <a:srgbClr val="0366D6"/>
                 </a:solidFill>
@@ -11843,11 +11840,11 @@
                 <a:ea typeface="Roboto"/>
                 <a:cs typeface="Roboto"/>
                 <a:sym typeface="Roboto"/>
-                <a:hlinkClick r:id="rId4"/>
+                <a:hlinkClick r:id="rId3"/>
               </a:rPr>
               <a:t>https://arxiv.org/abs/1808.10245</a:t>
             </a:r>
-            <a:endParaRPr sz="900">
+            <a:endParaRPr sz="900" dirty="0">
               <a:latin typeface="Roboto"/>
               <a:ea typeface="Roboto"/>
               <a:cs typeface="Roboto"/>

</xml_diff>